<commit_message>
Fixed the briefing on 3d tetris, added the small shooting course as triple kill
</commit_message>
<xml_diff>
--- a/26-30 rounds/3D Tetris - 30 rounds - Comstock/3D Tetris.pptx
+++ b/26-30 rounds/3D Tetris - 30 rounds - Comstock/3D Tetris.pptx
@@ -258,7 +258,7 @@
               <a:pPr>
                 <a:defRPr/>
               </a:pPr>
-              <a:t>4/19/2019</a:t>
+              <a:t>5/22/2019</a:t>
             </a:fld>
             <a:endParaRPr lang="en-US"/>
           </a:p>
@@ -4159,7 +4159,7 @@
           <p:nvPr>
             <p:extLst>
               <p:ext uri="{D42A27DB-BD31-4B8C-83A1-F6EECF244321}">
-                <p14:modId xmlns:p14="http://schemas.microsoft.com/office/powerpoint/2010/main" val="1835825532"/>
+                <p14:modId xmlns:p14="http://schemas.microsoft.com/office/powerpoint/2010/main" val="3708781980"/>
               </p:ext>
             </p:extLst>
           </p:nvPr>
@@ -4913,7 +4913,37 @@
                           <a:ea typeface="ＭＳ Ｐゴシック" pitchFamily="-112" charset="-128"/>
                           <a:cs typeface="Times New Roman" pitchFamily="-112" charset="0"/>
                         </a:rPr>
-                        <a:t>SCORED HITS:        Best 2 on paper, steel until down</a:t>
+                        <a:t>SCORED HITS:        </a:t>
+                      </a:r>
+                      <a:r>
+                        <a:rPr kumimoji="0" lang="en-US" sz="1100" b="1" i="0" u="none" strike="noStrike" cap="none" normalizeH="0" baseline="0">
+                          <a:ln>
+                            <a:noFill/>
+                          </a:ln>
+                          <a:solidFill>
+                            <a:schemeClr val="tx1"/>
+                          </a:solidFill>
+                          <a:effectLst/>
+                          <a:latin typeface="Arial" charset="0"/>
+                          <a:ea typeface="ＭＳ Ｐゴシック" pitchFamily="-112" charset="-128"/>
+                          <a:cs typeface="Times New Roman" pitchFamily="-112" charset="0"/>
+                        </a:rPr>
+                        <a:t>Best 3 </a:t>
+                      </a:r>
+                      <a:r>
+                        <a:rPr kumimoji="0" lang="en-US" sz="1100" b="1" i="0" u="none" strike="noStrike" cap="none" normalizeH="0" baseline="0" dirty="0">
+                          <a:ln>
+                            <a:noFill/>
+                          </a:ln>
+                          <a:solidFill>
+                            <a:schemeClr val="tx1"/>
+                          </a:solidFill>
+                          <a:effectLst/>
+                          <a:latin typeface="Arial" charset="0"/>
+                          <a:ea typeface="ＭＳ Ｐゴシック" pitchFamily="-112" charset="-128"/>
+                          <a:cs typeface="Times New Roman" pitchFamily="-112" charset="0"/>
+                        </a:rPr>
+                        <a:t>on paper, steel until down</a:t>
                       </a:r>
                     </a:p>
                     <a:p>

</xml_diff>